<commit_message>
first commit P2911 AC
</commit_message>
<xml_diff>
--- a/Day124/P2911 Solve.pptx
+++ b/Day124/P2911 Solve.pptx
@@ -3830,7 +3830,7 @@
           <p:nvPr>
             <p:extLst>
               <p:ext uri="{D42A27DB-BD31-4B8C-83A1-F6EECF244321}">
-                <p14:modId xmlns:p14="http://schemas.microsoft.com/office/powerpoint/2010/main" val="3175392425"/>
+                <p14:modId xmlns:p14="http://schemas.microsoft.com/office/powerpoint/2010/main" val="2991849551"/>
               </p:ext>
             </p:extLst>
           </p:nvPr>
@@ -4843,7 +4843,7 @@
           <p:nvPr>
             <p:extLst>
               <p:ext uri="{D42A27DB-BD31-4B8C-83A1-F6EECF244321}">
-                <p14:modId xmlns:p14="http://schemas.microsoft.com/office/powerpoint/2010/main" val="1621559580"/>
+                <p14:modId xmlns:p14="http://schemas.microsoft.com/office/powerpoint/2010/main" val="1375900787"/>
               </p:ext>
             </p:extLst>
           </p:nvPr>
@@ -4934,6 +4934,7 @@
               </a:bodyPr>
               <a:lstStyle/>
               <a:p>
+                <a:pPr/>
                 <a14:m>
                   <m:oMathPara xmlns:m="http://schemas.openxmlformats.org/officeDocument/2006/math">
                     <m:oMathParaPr>
@@ -5095,6 +5096,7 @@
               </a:bodyPr>
               <a:lstStyle/>
               <a:p>
+                <a:pPr/>
                 <a14:m>
                   <m:oMathPara xmlns:m="http://schemas.openxmlformats.org/officeDocument/2006/math">
                     <m:oMathParaPr>
@@ -5252,6 +5254,7 @@
               </a:bodyPr>
               <a:lstStyle/>
               <a:p>
+                <a:pPr/>
                 <a14:m>
                   <m:oMathPara xmlns:m="http://schemas.openxmlformats.org/officeDocument/2006/math">
                     <m:oMathParaPr>
@@ -5347,6 +5350,7 @@
               </a:bodyPr>
               <a:lstStyle/>
               <a:p>
+                <a:pPr/>
                 <a14:m>
                   <m:oMathPara xmlns:m="http://schemas.openxmlformats.org/officeDocument/2006/math">
                     <m:oMathParaPr>
@@ -5566,6 +5570,7 @@
               </a:bodyPr>
               <a:lstStyle/>
               <a:p>
+                <a:pPr/>
                 <a14:m>
                   <m:oMathPara xmlns:m="http://schemas.openxmlformats.org/officeDocument/2006/math">
                     <m:oMathParaPr>
@@ -5856,6 +5861,7 @@
               </a:bodyPr>
               <a:lstStyle/>
               <a:p>
+                <a:pPr/>
                 <a14:m>
                   <m:oMathPara xmlns:m="http://schemas.openxmlformats.org/officeDocument/2006/math">
                     <m:oMathParaPr>
@@ -6003,6 +6009,7 @@
               </a:bodyPr>
               <a:lstStyle/>
               <a:p>
+                <a:pPr/>
                 <a14:m>
                   <m:oMathPara xmlns:m="http://schemas.openxmlformats.org/officeDocument/2006/math">
                     <m:oMathParaPr>
@@ -6098,6 +6105,7 @@
               </a:bodyPr>
               <a:lstStyle/>
               <a:p>
+                <a:pPr/>
                 <a14:m>
                   <m:oMathPara xmlns:m="http://schemas.openxmlformats.org/officeDocument/2006/math">
                     <m:oMathParaPr>
@@ -6193,6 +6201,7 @@
               </a:bodyPr>
               <a:lstStyle/>
               <a:p>
+                <a:pPr/>
                 <a14:m>
                   <m:oMathPara xmlns:m="http://schemas.openxmlformats.org/officeDocument/2006/math">
                     <m:oMathParaPr>
@@ -6575,6 +6584,7 @@
               </a:bodyPr>
               <a:lstStyle/>
               <a:p>
+                <a:pPr/>
                 <a14:m>
                   <m:oMathPara xmlns:m="http://schemas.openxmlformats.org/officeDocument/2006/math">
                     <m:oMathParaPr>
@@ -6722,6 +6732,7 @@
               </a:bodyPr>
               <a:lstStyle/>
               <a:p>
+                <a:pPr/>
                 <a14:m>
                   <m:oMathPara xmlns:m="http://schemas.openxmlformats.org/officeDocument/2006/math">
                     <m:oMathParaPr>
@@ -6817,6 +6828,7 @@
               </a:bodyPr>
               <a:lstStyle/>
               <a:p>
+                <a:pPr/>
                 <a14:m>
                   <m:oMathPara xmlns:m="http://schemas.openxmlformats.org/officeDocument/2006/math">
                     <m:oMathParaPr>
@@ -6912,6 +6924,7 @@
               </a:bodyPr>
               <a:lstStyle/>
               <a:p>
+                <a:pPr/>
                 <a14:m>
                   <m:oMathPara xmlns:m="http://schemas.openxmlformats.org/officeDocument/2006/math">
                     <m:oMathParaPr>
@@ -7171,6 +7184,7 @@
               </a:bodyPr>
               <a:lstStyle/>
               <a:p>
+                <a:pPr/>
                 <a14:m>
                   <m:oMathPara xmlns:m="http://schemas.openxmlformats.org/officeDocument/2006/math">
                     <m:oMathParaPr>
@@ -7318,6 +7332,7 @@
               </a:bodyPr>
               <a:lstStyle/>
               <a:p>
+                <a:pPr/>
                 <a14:m>
                   <m:oMathPara xmlns:m="http://schemas.openxmlformats.org/officeDocument/2006/math">
                     <m:oMathParaPr>
@@ -7425,6 +7440,7 @@
               </a:bodyPr>
               <a:lstStyle/>
               <a:p>
+                <a:pPr/>
                 <a14:m>
                   <m:oMathPara xmlns:m="http://schemas.openxmlformats.org/officeDocument/2006/math">
                     <m:oMathParaPr>

</xml_diff>